<commit_message>
Added PCA and random forest
</commit_message>
<xml_diff>
--- a/Happy2017-Avi.pptx
+++ b/Happy2017-Avi.pptx
@@ -19,13 +19,13 @@
   <p:notesSz cx="6858000" cy="9144000"/>
   <p:embeddedFontLst>
     <p:embeddedFont>
-      <p:font typeface="Sniglet" panose="020B0604020202020204" charset="0"/>
+      <p:font typeface="ABeeZee" panose="020B0604020202020204" charset="0"/>
       <p:regular r:id="rId9"/>
+      <p:italic r:id="rId10"/>
     </p:embeddedFont>
     <p:embeddedFont>
-      <p:font typeface="ABeeZee" panose="020B0604020202020204" charset="0"/>
-      <p:regular r:id="rId10"/>
-      <p:italic r:id="rId11"/>
+      <p:font typeface="Sniglet" panose="020B0604020202020204" charset="0"/>
+      <p:regular r:id="rId11"/>
     </p:embeddedFont>
   </p:embeddedFontLst>
   <p:defaultTextStyle>
@@ -9403,17 +9403,7 @@
                 <a:latin typeface="ABeeZee"/>
                 <a:sym typeface="ABeeZee"/>
               </a:rPr>
-              <a:t> - </a:t>
-            </a:r>
-            <a:r>
-              <a:rPr lang="en-US" sz="2800" dirty="0">
-                <a:solidFill>
-                  <a:srgbClr val="474F67"/>
-                </a:solidFill>
-                <a:latin typeface="ABeeZee"/>
-                <a:sym typeface="ABeeZee"/>
-              </a:rPr>
-              <a:t>The </a:t>
+              <a:t> - The </a:t>
             </a:r>
             <a:r>
               <a:rPr lang="en-US" sz="2800" dirty="0" err="1">
@@ -9488,13 +9478,6 @@
               </a:rPr>
               <a:t> - A Python library that provides functions to retrieve names and codes of continents, countries and US states as Python dictionaries.</a:t>
             </a:r>
-            <a:endParaRPr lang="en-US" sz="2800" dirty="0">
-              <a:solidFill>
-                <a:srgbClr val="474F67"/>
-              </a:solidFill>
-              <a:latin typeface="ABeeZee"/>
-              <a:sym typeface="ABeeZee"/>
-            </a:endParaRPr>
           </a:p>
           <a:p>
             <a:pPr algn="just"/>
@@ -12884,7 +12867,7 @@
         </p:blipFill>
         <p:spPr>
           <a:xfrm>
-            <a:off x="-41751" y="44419"/>
+            <a:off x="-257846" y="0"/>
             <a:ext cx="9185751" cy="5143500"/>
           </a:xfrm>
           <a:prstGeom prst="rect">
@@ -12908,7 +12891,7 @@
         </p:blipFill>
         <p:spPr>
           <a:xfrm>
-            <a:off x="-11051" y="0"/>
+            <a:off x="-435998" y="96906"/>
             <a:ext cx="9176844" cy="5143500"/>
           </a:xfrm>
           <a:prstGeom prst="rect">
@@ -12942,7 +12925,7 @@
                             </p:stCondLst>
                             <p:childTnLst>
                               <p:par>
-                                <p:cTn id="5" presetID="45" presetClass="entr" presetSubtype="0" fill="hold" nodeType="clickEffect">
+                                <p:cTn id="5" presetID="10" presetClass="entr" presetSubtype="0" fill="hold" nodeType="clickEffect">
                                   <p:stCondLst>
                                     <p:cond delay="0"/>
                                   </p:stCondLst>
@@ -12967,58 +12950,12 @@
                                     </p:set>
                                     <p:animEffect transition="in" filter="fade">
                                       <p:cBhvr>
-                                        <p:cTn id="7" dur="2000"/>
+                                        <p:cTn id="7" dur="500"/>
                                         <p:tgtEl>
                                           <p:spTgt spid="37"/>
                                         </p:tgtEl>
                                       </p:cBhvr>
                                     </p:animEffect>
-                                    <p:anim calcmode="lin" valueType="num">
-                                      <p:cBhvr>
-                                        <p:cTn id="8" dur="2000" fill="hold"/>
-                                        <p:tgtEl>
-                                          <p:spTgt spid="37"/>
-                                        </p:tgtEl>
-                                        <p:attrNameLst>
-                                          <p:attrName>ppt_w</p:attrName>
-                                        </p:attrNameLst>
-                                      </p:cBhvr>
-                                      <p:tavLst>
-                                        <p:tav tm="0" fmla="#ppt_w*sin(2.5*pi*$)">
-                                          <p:val>
-                                            <p:fltVal val="0"/>
-                                          </p:val>
-                                        </p:tav>
-                                        <p:tav tm="100000">
-                                          <p:val>
-                                            <p:fltVal val="1"/>
-                                          </p:val>
-                                        </p:tav>
-                                      </p:tavLst>
-                                    </p:anim>
-                                    <p:anim calcmode="lin" valueType="num">
-                                      <p:cBhvr>
-                                        <p:cTn id="9" dur="2000" fill="hold"/>
-                                        <p:tgtEl>
-                                          <p:spTgt spid="37"/>
-                                        </p:tgtEl>
-                                        <p:attrNameLst>
-                                          <p:attrName>ppt_h</p:attrName>
-                                        </p:attrNameLst>
-                                      </p:cBhvr>
-                                      <p:tavLst>
-                                        <p:tav tm="0">
-                                          <p:val>
-                                            <p:strVal val="#ppt_h"/>
-                                          </p:val>
-                                        </p:tav>
-                                        <p:tav tm="100000">
-                                          <p:val>
-                                            <p:strVal val="#ppt_h"/>
-                                          </p:val>
-                                        </p:tav>
-                                      </p:tavLst>
-                                    </p:anim>
                                   </p:childTnLst>
                                 </p:cTn>
                               </p:par>
@@ -13029,26 +12966,26 @@
                     </p:cTn>
                   </p:par>
                   <p:par>
-                    <p:cTn id="10" fill="hold">
+                    <p:cTn id="8" fill="hold">
                       <p:stCondLst>
                         <p:cond delay="indefinite"/>
                       </p:stCondLst>
                       <p:childTnLst>
                         <p:par>
-                          <p:cTn id="11" fill="hold">
+                          <p:cTn id="9" fill="hold">
                             <p:stCondLst>
                               <p:cond delay="0"/>
                             </p:stCondLst>
                             <p:childTnLst>
                               <p:par>
-                                <p:cTn id="12" presetID="14" presetClass="entr" presetSubtype="10" fill="hold" nodeType="clickEffect">
+                                <p:cTn id="10" presetID="14" presetClass="entr" presetSubtype="10" fill="hold" nodeType="clickEffect">
                                   <p:stCondLst>
                                     <p:cond delay="0"/>
                                   </p:stCondLst>
                                   <p:childTnLst>
                                     <p:set>
                                       <p:cBhvr>
-                                        <p:cTn id="13" dur="1" fill="hold">
+                                        <p:cTn id="11" dur="1" fill="hold">
                                           <p:stCondLst>
                                             <p:cond delay="0"/>
                                           </p:stCondLst>
@@ -13066,7 +13003,7 @@
                                     </p:set>
                                     <p:animEffect transition="in" filter="randombar(horizontal)">
                                       <p:cBhvr>
-                                        <p:cTn id="14" dur="500"/>
+                                        <p:cTn id="12" dur="500"/>
                                         <p:tgtEl>
                                           <p:spTgt spid="4"/>
                                         </p:tgtEl>
@@ -25265,7 +25202,7 @@
                             </p:stCondLst>
                             <p:childTnLst>
                               <p:par>
-                                <p:cTn id="5" presetID="21" presetClass="entr" presetSubtype="1" fill="hold" nodeType="clickEffect">
+                                <p:cTn id="5" presetID="31" presetClass="entr" presetSubtype="0" fill="hold" nodeType="clickEffect">
                                   <p:stCondLst>
                                     <p:cond delay="0"/>
                                   </p:stCondLst>
@@ -25288,9 +25225,78 @@
                                         <p:strVal val="visible"/>
                                       </p:to>
                                     </p:set>
-                                    <p:animEffect transition="in" filter="wheel(1)">
+                                    <p:anim calcmode="lin" valueType="num">
                                       <p:cBhvr>
-                                        <p:cTn id="7" dur="2000"/>
+                                        <p:cTn id="7" dur="1000" fill="hold"/>
+                                        <p:tgtEl>
+                                          <p:spTgt spid="4"/>
+                                        </p:tgtEl>
+                                        <p:attrNameLst>
+                                          <p:attrName>ppt_w</p:attrName>
+                                        </p:attrNameLst>
+                                      </p:cBhvr>
+                                      <p:tavLst>
+                                        <p:tav tm="0">
+                                          <p:val>
+                                            <p:fltVal val="0"/>
+                                          </p:val>
+                                        </p:tav>
+                                        <p:tav tm="100000">
+                                          <p:val>
+                                            <p:strVal val="#ppt_w"/>
+                                          </p:val>
+                                        </p:tav>
+                                      </p:tavLst>
+                                    </p:anim>
+                                    <p:anim calcmode="lin" valueType="num">
+                                      <p:cBhvr>
+                                        <p:cTn id="8" dur="1000" fill="hold"/>
+                                        <p:tgtEl>
+                                          <p:spTgt spid="4"/>
+                                        </p:tgtEl>
+                                        <p:attrNameLst>
+                                          <p:attrName>ppt_h</p:attrName>
+                                        </p:attrNameLst>
+                                      </p:cBhvr>
+                                      <p:tavLst>
+                                        <p:tav tm="0">
+                                          <p:val>
+                                            <p:fltVal val="0"/>
+                                          </p:val>
+                                        </p:tav>
+                                        <p:tav tm="100000">
+                                          <p:val>
+                                            <p:strVal val="#ppt_h"/>
+                                          </p:val>
+                                        </p:tav>
+                                      </p:tavLst>
+                                    </p:anim>
+                                    <p:anim calcmode="lin" valueType="num">
+                                      <p:cBhvr>
+                                        <p:cTn id="9" dur="1000" fill="hold"/>
+                                        <p:tgtEl>
+                                          <p:spTgt spid="4"/>
+                                        </p:tgtEl>
+                                        <p:attrNameLst>
+                                          <p:attrName>style.rotation</p:attrName>
+                                        </p:attrNameLst>
+                                      </p:cBhvr>
+                                      <p:tavLst>
+                                        <p:tav tm="0">
+                                          <p:val>
+                                            <p:fltVal val="90"/>
+                                          </p:val>
+                                        </p:tav>
+                                        <p:tav tm="100000">
+                                          <p:val>
+                                            <p:fltVal val="0"/>
+                                          </p:val>
+                                        </p:tav>
+                                      </p:tavLst>
+                                    </p:anim>
+                                    <p:animEffect transition="in" filter="fade">
+                                      <p:cBhvr>
+                                        <p:cTn id="10" dur="1000"/>
                                         <p:tgtEl>
                                           <p:spTgt spid="4"/>
                                         </p:tgtEl>

</xml_diff>